<commit_message>
week 12: update slides
</commit_message>
<xml_diff>
--- a/week_12/week_12.pptx
+++ b/week_12/week_12.pptx
@@ -214,7 +214,7 @@
           <a:p>
             <a:fld id="{A756DEA0-F944-5946-9B95-BC7B5255CD05}" type="datetimeFigureOut">
               <a:rPr lang="en-US" smtClean="0"/>
-              <a:t>4/15/16</a:t>
+              <a:t>11/14/16</a:t>
             </a:fld>
             <a:endParaRPr lang="en-US"/>
           </a:p>
@@ -526,7 +526,7 @@
           <a:bodyPr/>
           <a:lstStyle/>
           <a:p>
-            <a:endParaRPr lang="en-US" dirty="0"/>
+            <a:endParaRPr lang="en-US"/>
           </a:p>
         </p:txBody>
       </p:sp>
@@ -547,7 +547,7 @@
           <a:p>
             <a:fld id="{0FF3EE0D-70A9-3744-80A0-179DFFBD3C67}" type="slidenum">
               <a:rPr lang="en-US" smtClean="0"/>
-              <a:t>5</a:t>
+              <a:t>1</a:t>
             </a:fld>
             <a:endParaRPr lang="en-US"/>
           </a:p>
@@ -556,7 +556,7 @@
     </p:spTree>
     <p:extLst>
       <p:ext uri="{BB962C8B-B14F-4D97-AF65-F5344CB8AC3E}">
-        <p14:creationId xmlns:p14="http://schemas.microsoft.com/office/powerpoint/2010/main" val="700590728"/>
+        <p14:creationId xmlns:p14="http://schemas.microsoft.com/office/powerpoint/2010/main" val="1022286201"/>
       </p:ext>
     </p:extLst>
   </p:cSld>
@@ -631,7 +631,7 @@
           <a:p>
             <a:fld id="{0FF3EE0D-70A9-3744-80A0-179DFFBD3C67}" type="slidenum">
               <a:rPr lang="en-US" smtClean="0"/>
-              <a:t>14</a:t>
+              <a:t>13</a:t>
             </a:fld>
             <a:endParaRPr lang="en-US"/>
           </a:p>
@@ -640,7 +640,7 @@
     </p:spTree>
     <p:extLst>
       <p:ext uri="{BB962C8B-B14F-4D97-AF65-F5344CB8AC3E}">
-        <p14:creationId xmlns:p14="http://schemas.microsoft.com/office/powerpoint/2010/main" val="1165832128"/>
+        <p14:creationId xmlns:p14="http://schemas.microsoft.com/office/powerpoint/2010/main" val="1480503293"/>
       </p:ext>
     </p:extLst>
   </p:cSld>
@@ -715,7 +715,7 @@
           <a:p>
             <a:fld id="{0FF3EE0D-70A9-3744-80A0-179DFFBD3C67}" type="slidenum">
               <a:rPr lang="en-US" smtClean="0"/>
-              <a:t>15</a:t>
+              <a:t>14</a:t>
             </a:fld>
             <a:endParaRPr lang="en-US"/>
           </a:p>
@@ -724,7 +724,7 @@
     </p:spTree>
     <p:extLst>
       <p:ext uri="{BB962C8B-B14F-4D97-AF65-F5344CB8AC3E}">
-        <p14:creationId xmlns:p14="http://schemas.microsoft.com/office/powerpoint/2010/main" val="534008665"/>
+        <p14:creationId xmlns:p14="http://schemas.microsoft.com/office/powerpoint/2010/main" val="1165832128"/>
       </p:ext>
     </p:extLst>
   </p:cSld>
@@ -799,6 +799,90 @@
           <a:p>
             <a:fld id="{0FF3EE0D-70A9-3744-80A0-179DFFBD3C67}" type="slidenum">
               <a:rPr lang="en-US" smtClean="0"/>
+              <a:t>15</a:t>
+            </a:fld>
+            <a:endParaRPr lang="en-US"/>
+          </a:p>
+        </p:txBody>
+      </p:sp>
+    </p:spTree>
+    <p:extLst>
+      <p:ext uri="{BB962C8B-B14F-4D97-AF65-F5344CB8AC3E}">
+        <p14:creationId xmlns:p14="http://schemas.microsoft.com/office/powerpoint/2010/main" val="534008665"/>
+      </p:ext>
+    </p:extLst>
+  </p:cSld>
+  <p:clrMapOvr>
+    <a:masterClrMapping/>
+  </p:clrMapOvr>
+</p:notes>
+</file>
+
+<file path=ppt/notesSlides/notesSlide13.xml><?xml version="1.0" encoding="utf-8"?>
+<p:notes xmlns:a="http://schemas.openxmlformats.org/drawingml/2006/main" xmlns:r="http://schemas.openxmlformats.org/officeDocument/2006/relationships" xmlns:p="http://schemas.openxmlformats.org/presentationml/2006/main">
+  <p:cSld>
+    <p:spTree>
+      <p:nvGrpSpPr>
+        <p:cNvPr id="1" name=""/>
+        <p:cNvGrpSpPr/>
+        <p:nvPr/>
+      </p:nvGrpSpPr>
+      <p:grpSpPr>
+        <a:xfrm>
+          <a:off x="0" y="0"/>
+          <a:ext cx="0" cy="0"/>
+          <a:chOff x="0" y="0"/>
+          <a:chExt cx="0" cy="0"/>
+        </a:xfrm>
+      </p:grpSpPr>
+      <p:sp>
+        <p:nvSpPr>
+          <p:cNvPr id="2" name="Slide Image Placeholder 1"/>
+          <p:cNvSpPr>
+            <a:spLocks noGrp="1" noRot="1" noChangeAspect="1"/>
+          </p:cNvSpPr>
+          <p:nvPr>
+            <p:ph type="sldImg"/>
+          </p:nvPr>
+        </p:nvSpPr>
+        <p:spPr/>
+      </p:sp>
+      <p:sp>
+        <p:nvSpPr>
+          <p:cNvPr id="3" name="Notes Placeholder 2"/>
+          <p:cNvSpPr>
+            <a:spLocks noGrp="1"/>
+          </p:cNvSpPr>
+          <p:nvPr>
+            <p:ph type="body" idx="1"/>
+          </p:nvPr>
+        </p:nvSpPr>
+        <p:spPr/>
+        <p:txBody>
+          <a:bodyPr/>
+          <a:lstStyle/>
+          <a:p>
+            <a:endParaRPr lang="en-US" dirty="0"/>
+          </a:p>
+        </p:txBody>
+      </p:sp>
+      <p:sp>
+        <p:nvSpPr>
+          <p:cNvPr id="4" name="Slide Number Placeholder 3"/>
+          <p:cNvSpPr>
+            <a:spLocks noGrp="1"/>
+          </p:cNvSpPr>
+          <p:nvPr>
+            <p:ph type="sldNum" sz="quarter" idx="10"/>
+          </p:nvPr>
+        </p:nvSpPr>
+        <p:spPr/>
+        <p:txBody>
+          <a:bodyPr/>
+          <a:lstStyle/>
+          <a:p>
+            <a:fld id="{0FF3EE0D-70A9-3744-80A0-179DFFBD3C67}" type="slidenum">
+              <a:rPr lang="en-US" smtClean="0"/>
               <a:t>16</a:t>
             </a:fld>
             <a:endParaRPr lang="en-US"/>
@@ -818,7 +902,7 @@
 </p:notes>
 </file>
 
-<file path=ppt/notesSlides/notesSlide13.xml><?xml version="1.0" encoding="utf-8"?>
+<file path=ppt/notesSlides/notesSlide14.xml><?xml version="1.0" encoding="utf-8"?>
 <p:notes xmlns:a="http://schemas.openxmlformats.org/drawingml/2006/main" xmlns:r="http://schemas.openxmlformats.org/officeDocument/2006/relationships" xmlns:p="http://schemas.openxmlformats.org/presentationml/2006/main">
   <p:cSld>
     <p:spTree>
@@ -967,7 +1051,7 @@
           <a:p>
             <a:fld id="{0FF3EE0D-70A9-3744-80A0-179DFFBD3C67}" type="slidenum">
               <a:rPr lang="en-US" smtClean="0"/>
-              <a:t>6</a:t>
+              <a:t>5</a:t>
             </a:fld>
             <a:endParaRPr lang="en-US"/>
           </a:p>
@@ -976,7 +1060,7 @@
     </p:spTree>
     <p:extLst>
       <p:ext uri="{BB962C8B-B14F-4D97-AF65-F5344CB8AC3E}">
-        <p14:creationId xmlns:p14="http://schemas.microsoft.com/office/powerpoint/2010/main" val="378290848"/>
+        <p14:creationId xmlns:p14="http://schemas.microsoft.com/office/powerpoint/2010/main" val="700590728"/>
       </p:ext>
     </p:extLst>
   </p:cSld>
@@ -1051,7 +1135,7 @@
           <a:p>
             <a:fld id="{0FF3EE0D-70A9-3744-80A0-179DFFBD3C67}" type="slidenum">
               <a:rPr lang="en-US" smtClean="0"/>
-              <a:t>7</a:t>
+              <a:t>6</a:t>
             </a:fld>
             <a:endParaRPr lang="en-US"/>
           </a:p>
@@ -1060,7 +1144,7 @@
     </p:spTree>
     <p:extLst>
       <p:ext uri="{BB962C8B-B14F-4D97-AF65-F5344CB8AC3E}">
-        <p14:creationId xmlns:p14="http://schemas.microsoft.com/office/powerpoint/2010/main" val="1521475858"/>
+        <p14:creationId xmlns:p14="http://schemas.microsoft.com/office/powerpoint/2010/main" val="378290848"/>
       </p:ext>
     </p:extLst>
   </p:cSld>
@@ -1135,7 +1219,7 @@
           <a:p>
             <a:fld id="{0FF3EE0D-70A9-3744-80A0-179DFFBD3C67}" type="slidenum">
               <a:rPr lang="en-US" smtClean="0"/>
-              <a:t>8</a:t>
+              <a:t>7</a:t>
             </a:fld>
             <a:endParaRPr lang="en-US"/>
           </a:p>
@@ -1144,7 +1228,7 @@
     </p:spTree>
     <p:extLst>
       <p:ext uri="{BB962C8B-B14F-4D97-AF65-F5344CB8AC3E}">
-        <p14:creationId xmlns:p14="http://schemas.microsoft.com/office/powerpoint/2010/main" val="1752086253"/>
+        <p14:creationId xmlns:p14="http://schemas.microsoft.com/office/powerpoint/2010/main" val="1521475858"/>
       </p:ext>
     </p:extLst>
   </p:cSld>
@@ -1219,7 +1303,7 @@
           <a:p>
             <a:fld id="{0FF3EE0D-70A9-3744-80A0-179DFFBD3C67}" type="slidenum">
               <a:rPr lang="en-US" smtClean="0"/>
-              <a:t>9</a:t>
+              <a:t>8</a:t>
             </a:fld>
             <a:endParaRPr lang="en-US"/>
           </a:p>
@@ -1228,7 +1312,7 @@
     </p:spTree>
     <p:extLst>
       <p:ext uri="{BB962C8B-B14F-4D97-AF65-F5344CB8AC3E}">
-        <p14:creationId xmlns:p14="http://schemas.microsoft.com/office/powerpoint/2010/main" val="1977928785"/>
+        <p14:creationId xmlns:p14="http://schemas.microsoft.com/office/powerpoint/2010/main" val="1752086253"/>
       </p:ext>
     </p:extLst>
   </p:cSld>
@@ -1303,7 +1387,7 @@
           <a:p>
             <a:fld id="{0FF3EE0D-70A9-3744-80A0-179DFFBD3C67}" type="slidenum">
               <a:rPr lang="en-US" smtClean="0"/>
-              <a:t>10</a:t>
+              <a:t>9</a:t>
             </a:fld>
             <a:endParaRPr lang="en-US"/>
           </a:p>
@@ -1312,7 +1396,7 @@
     </p:spTree>
     <p:extLst>
       <p:ext uri="{BB962C8B-B14F-4D97-AF65-F5344CB8AC3E}">
-        <p14:creationId xmlns:p14="http://schemas.microsoft.com/office/powerpoint/2010/main" val="1800522714"/>
+        <p14:creationId xmlns:p14="http://schemas.microsoft.com/office/powerpoint/2010/main" val="1977928785"/>
       </p:ext>
     </p:extLst>
   </p:cSld>
@@ -1387,7 +1471,7 @@
           <a:p>
             <a:fld id="{0FF3EE0D-70A9-3744-80A0-179DFFBD3C67}" type="slidenum">
               <a:rPr lang="en-US" smtClean="0"/>
-              <a:t>11</a:t>
+              <a:t>10</a:t>
             </a:fld>
             <a:endParaRPr lang="en-US"/>
           </a:p>
@@ -1396,7 +1480,7 @@
     </p:spTree>
     <p:extLst>
       <p:ext uri="{BB962C8B-B14F-4D97-AF65-F5344CB8AC3E}">
-        <p14:creationId xmlns:p14="http://schemas.microsoft.com/office/powerpoint/2010/main" val="474341101"/>
+        <p14:creationId xmlns:p14="http://schemas.microsoft.com/office/powerpoint/2010/main" val="1800522714"/>
       </p:ext>
     </p:extLst>
   </p:cSld>
@@ -1471,7 +1555,7 @@
           <a:p>
             <a:fld id="{0FF3EE0D-70A9-3744-80A0-179DFFBD3C67}" type="slidenum">
               <a:rPr lang="en-US" smtClean="0"/>
-              <a:t>12</a:t>
+              <a:t>11</a:t>
             </a:fld>
             <a:endParaRPr lang="en-US"/>
           </a:p>
@@ -1480,7 +1564,7 @@
     </p:spTree>
     <p:extLst>
       <p:ext uri="{BB962C8B-B14F-4D97-AF65-F5344CB8AC3E}">
-        <p14:creationId xmlns:p14="http://schemas.microsoft.com/office/powerpoint/2010/main" val="2053163609"/>
+        <p14:creationId xmlns:p14="http://schemas.microsoft.com/office/powerpoint/2010/main" val="474341101"/>
       </p:ext>
     </p:extLst>
   </p:cSld>
@@ -1555,7 +1639,7 @@
           <a:p>
             <a:fld id="{0FF3EE0D-70A9-3744-80A0-179DFFBD3C67}" type="slidenum">
               <a:rPr lang="en-US" smtClean="0"/>
-              <a:t>13</a:t>
+              <a:t>12</a:t>
             </a:fld>
             <a:endParaRPr lang="en-US"/>
           </a:p>
@@ -1564,7 +1648,7 @@
     </p:spTree>
     <p:extLst>
       <p:ext uri="{BB962C8B-B14F-4D97-AF65-F5344CB8AC3E}">
-        <p14:creationId xmlns:p14="http://schemas.microsoft.com/office/powerpoint/2010/main" val="1480503293"/>
+        <p14:creationId xmlns:p14="http://schemas.microsoft.com/office/powerpoint/2010/main" val="2053163609"/>
       </p:ext>
     </p:extLst>
   </p:cSld>
@@ -1740,9 +1824,9 @@
             </a:lvl1pPr>
           </a:lstStyle>
           <a:p>
-            <a:fld id="{9E016143-E03C-4CFD-AFDC-14E5BDEA754C}" type="datetimeFigureOut">
-              <a:rPr lang="en-US" dirty="0"/>
-              <a:t>4/15/16</a:t>
+            <a:fld id="{E0252C48-3F67-D341-8672-081553B4D34D}" type="datetime1">
+              <a:rPr lang="en-US" smtClean="0"/>
+              <a:t>11/14/16</a:t>
             </a:fld>
             <a:endParaRPr lang="en-US" dirty="0"/>
           </a:p>
@@ -1964,9 +2048,9 @@
           <a:bodyPr/>
           <a:lstStyle/>
           <a:p>
-            <a:fld id="{C033E54A-A8CA-48C1-9504-691B58049D29}" type="datetimeFigureOut">
-              <a:rPr lang="en-US" dirty="0"/>
-              <a:t>4/15/16</a:t>
+            <a:fld id="{2BC3E32A-15F6-AE4B-83EA-CE806D4E6EB8}" type="datetime1">
+              <a:rPr lang="en-US" smtClean="0"/>
+              <a:t>11/14/16</a:t>
             </a:fld>
             <a:endParaRPr lang="en-US" dirty="0"/>
           </a:p>
@@ -2139,9 +2223,9 @@
           <a:bodyPr/>
           <a:lstStyle/>
           <a:p>
-            <a:fld id="{B5F6C806-BBF7-471C-9527-881CE2266695}" type="datetimeFigureOut">
-              <a:rPr lang="en-US" dirty="0"/>
-              <a:t>4/15/16</a:t>
+            <a:fld id="{A0388E53-4108-AF4D-9BB4-B2A790A9EF1B}" type="datetime1">
+              <a:rPr lang="en-US" smtClean="0"/>
+              <a:t>11/14/16</a:t>
             </a:fld>
             <a:endParaRPr lang="en-US" dirty="0"/>
           </a:p>
@@ -2304,9 +2388,9 @@
           <a:bodyPr/>
           <a:lstStyle/>
           <a:p>
-            <a:fld id="{78C94063-DF36-4330-A365-08DA1FA5B7D6}" type="datetimeFigureOut">
-              <a:rPr lang="en-US" dirty="0"/>
-              <a:t>4/15/16</a:t>
+            <a:fld id="{53D3D8E4-A904-4A4D-A4D7-759CDBECAFB8}" type="datetime1">
+              <a:rPr lang="en-US" smtClean="0"/>
+              <a:t>11/14/16</a:t>
             </a:fld>
             <a:endParaRPr lang="en-US" dirty="0"/>
           </a:p>
@@ -2553,9 +2637,9 @@
           <a:bodyPr/>
           <a:lstStyle/>
           <a:p>
-            <a:fld id="{908A7C6C-0F39-4D70-8E8D-FE5B9C95FA73}" type="datetimeFigureOut">
-              <a:rPr lang="en-US" dirty="0"/>
-              <a:t>4/15/16</a:t>
+            <a:fld id="{028DBA63-AF12-1545-9449-24750F677CF9}" type="datetime1">
+              <a:rPr lang="en-US" smtClean="0"/>
+              <a:t>11/14/16</a:t>
             </a:fld>
             <a:endParaRPr lang="en-US" dirty="0"/>
           </a:p>
@@ -2874,9 +2958,9 @@
           <a:bodyPr/>
           <a:lstStyle/>
           <a:p>
-            <a:fld id="{DFCFA4AC-08CC-42CE-BD01-C191750A04EC}" type="datetimeFigureOut">
-              <a:rPr lang="en-US" dirty="0"/>
-              <a:t>4/15/16</a:t>
+            <a:fld id="{B2170154-6070-C145-95A0-6560815C043C}" type="datetime1">
+              <a:rPr lang="en-US" smtClean="0"/>
+              <a:t>11/14/16</a:t>
             </a:fld>
             <a:endParaRPr lang="en-US" dirty="0"/>
           </a:p>
@@ -3320,9 +3404,9 @@
           <a:bodyPr/>
           <a:lstStyle/>
           <a:p>
-            <a:fld id="{1BA7A723-92A7-435B-B681-F25B092FEFEB}" type="datetimeFigureOut">
-              <a:rPr lang="en-US" dirty="0"/>
-              <a:t>4/15/16</a:t>
+            <a:fld id="{DE08DB36-A457-2E48-A4F9-833AFF7E5B78}" type="datetime1">
+              <a:rPr lang="en-US" smtClean="0"/>
+              <a:t>11/14/16</a:t>
             </a:fld>
             <a:endParaRPr lang="en-US" dirty="0"/>
           </a:p>
@@ -3433,9 +3517,9 @@
           <a:bodyPr/>
           <a:lstStyle/>
           <a:p>
-            <a:fld id="{4F170639-886C-4FCF-9EAB-ABB5DA3F3F4A}" type="datetimeFigureOut">
-              <a:rPr lang="en-US" dirty="0"/>
-              <a:t>4/15/16</a:t>
+            <a:fld id="{33C065FC-EDAC-F046-A954-FA69FED51777}" type="datetime1">
+              <a:rPr lang="en-US" smtClean="0"/>
+              <a:t>11/14/16</a:t>
             </a:fld>
             <a:endParaRPr lang="en-US" dirty="0"/>
           </a:p>
@@ -3523,9 +3607,9 @@
           <a:bodyPr/>
           <a:lstStyle/>
           <a:p>
-            <a:fld id="{22230651-31F4-45D2-98AE-A2108F41BC07}" type="datetimeFigureOut">
-              <a:rPr lang="en-US" dirty="0"/>
-              <a:t>4/15/16</a:t>
+            <a:fld id="{820C98F1-F8A2-3A4B-B3AE-5F0FF99C1470}" type="datetime1">
+              <a:rPr lang="en-US" smtClean="0"/>
+              <a:t>11/14/16</a:t>
             </a:fld>
             <a:endParaRPr lang="en-US" dirty="0"/>
           </a:p>
@@ -3805,9 +3889,9 @@
           <a:bodyPr/>
           <a:lstStyle/>
           <a:p>
-            <a:fld id="{6F53789A-C914-4DB1-8815-80B5EC7335C5}" type="datetimeFigureOut">
-              <a:rPr lang="en-US" dirty="0"/>
-              <a:t>4/15/16</a:t>
+            <a:fld id="{96C853FC-BFB0-464E-B166-401613C0160D}" type="datetime1">
+              <a:rPr lang="en-US" smtClean="0"/>
+              <a:t>11/14/16</a:t>
             </a:fld>
             <a:endParaRPr lang="en-US" dirty="0"/>
           </a:p>
@@ -4125,9 +4209,9 @@
           <a:bodyPr/>
           <a:lstStyle/>
           <a:p>
-            <a:fld id="{5E6440AA-91A0-436F-8FDB-C0F939DCAE21}" type="datetimeFigureOut">
-              <a:rPr lang="en-US" dirty="0"/>
-              <a:t>4/15/16</a:t>
+            <a:fld id="{3946F647-BC0F-E14B-8AB7-7F712458675F}" type="datetime1">
+              <a:rPr lang="en-US" smtClean="0"/>
+              <a:t>11/14/16</a:t>
             </a:fld>
             <a:endParaRPr lang="en-US" dirty="0"/>
           </a:p>
@@ -4374,9 +4458,9 @@
             </a:lvl1pPr>
           </a:lstStyle>
           <a:p>
-            <a:fld id="{0E59FD0C-5451-4CA0-86AF-E70AE3279989}" type="datetimeFigureOut">
-              <a:rPr lang="en-US" dirty="0"/>
-              <a:t>4/15/16</a:t>
+            <a:fld id="{20D8BF37-9AE2-5B4F-82A7-E9EB1A776AF8}" type="datetime1">
+              <a:rPr lang="en-US" smtClean="0"/>
+              <a:t>11/14/16</a:t>
             </a:fld>
             <a:endParaRPr lang="en-US" dirty="0"/>
           </a:p>
@@ -4481,7 +4565,7 @@
     <p:sldLayoutId id="2147483850" r:id="rId10"/>
     <p:sldLayoutId id="2147483851" r:id="rId11"/>
   </p:sldLayoutIdLst>
-  <p:hf sldNum="0" hdr="0" ftr="0" dt="0"/>
+  <p:hf hdr="0" ftr="0" dt="0"/>
   <p:txStyles>
     <p:titleStyle>
       <a:lvl1pPr algn="l" defTabSz="914400" rtl="0" eaLnBrk="1" latinLnBrk="0" hangingPunct="1">
@@ -4878,7 +4962,11 @@
           <a:p>
             <a:r>
               <a:rPr lang="en-US" dirty="0" smtClean="0"/>
-              <a:t>Programming Fundamentals for Android</a:t>
+              <a:t>Programming </a:t>
+            </a:r>
+            <a:r>
+              <a:rPr lang="en-US" dirty="0" smtClean="0"/>
+              <a:t>Fundamentals for Android</a:t>
             </a:r>
             <a:endParaRPr lang="en-US" dirty="0"/>
           </a:p>
@@ -4901,14 +4989,38 @@
           <a:p>
             <a:r>
               <a:rPr lang="en-US" dirty="0" smtClean="0"/>
-              <a:t>Week 12: Generics</a:t>
-            </a:r>
-          </a:p>
-          <a:p>
+              <a:t>Week 12: </a:t>
+            </a:r>
             <a:r>
               <a:rPr lang="en-US" dirty="0" smtClean="0"/>
-              <a:t>April 14, 2016</a:t>
-            </a:r>
+              <a:t>Generics</a:t>
+            </a:r>
+            <a:endParaRPr lang="en-US" dirty="0" smtClean="0"/>
+          </a:p>
+        </p:txBody>
+      </p:sp>
+      <p:sp>
+        <p:nvSpPr>
+          <p:cNvPr id="4" name="Slide Number Placeholder 3"/>
+          <p:cNvSpPr>
+            <a:spLocks noGrp="1"/>
+          </p:cNvSpPr>
+          <p:nvPr>
+            <p:ph type="sldNum" sz="quarter" idx="12"/>
+          </p:nvPr>
+        </p:nvSpPr>
+        <p:spPr/>
+        <p:txBody>
+          <a:bodyPr>
+            <a:normAutofit lnSpcReduction="10000"/>
+          </a:bodyPr>
+          <a:lstStyle/>
+          <a:p>
+            <a:fld id="{4FAB73BC-B049-4115-A692-8D63A059BFB8}" type="slidenum">
+              <a:rPr lang="en-US" smtClean="0"/>
+              <a:pPr/>
+              <a:t>1</a:t>
+            </a:fld>
             <a:endParaRPr lang="en-US" dirty="0"/>
           </a:p>
         </p:txBody>
@@ -5104,15 +5216,7 @@
             </a:r>
             <a:r>
               <a:rPr lang="en-US" sz="3000" dirty="0" smtClean="0"/>
-              <a:t>, is used to indicate that the type is </a:t>
-            </a:r>
-            <a:r>
-              <a:rPr lang="en-US" sz="3000" dirty="0" smtClean="0"/>
-              <a:t>unknown </a:t>
-            </a:r>
-            <a:r>
-              <a:rPr lang="en-US" sz="3000" dirty="0" smtClean="0"/>
-              <a:t>(</a:t>
+              <a:t>, is used to indicate that the type is unknown (</a:t>
             </a:r>
             <a:r>
               <a:rPr lang="en-US" sz="3000" i="1" dirty="0" smtClean="0"/>
@@ -5131,6 +5235,31 @@
               <a:t>)</a:t>
             </a:r>
             <a:endParaRPr lang="en-US" sz="3000" b="1" dirty="0" smtClean="0"/>
+          </a:p>
+        </p:txBody>
+      </p:sp>
+      <p:sp>
+        <p:nvSpPr>
+          <p:cNvPr id="4" name="Slide Number Placeholder 3"/>
+          <p:cNvSpPr>
+            <a:spLocks noGrp="1"/>
+          </p:cNvSpPr>
+          <p:nvPr>
+            <p:ph type="sldNum" sz="quarter" idx="12"/>
+          </p:nvPr>
+        </p:nvSpPr>
+        <p:spPr/>
+        <p:txBody>
+          <a:bodyPr>
+            <a:normAutofit lnSpcReduction="10000"/>
+          </a:bodyPr>
+          <a:lstStyle/>
+          <a:p>
+            <a:fld id="{4FAB73BC-B049-4115-A692-8D63A059BFB8}" type="slidenum">
+              <a:rPr lang="en-US" smtClean="0"/>
+              <a:t>10</a:t>
+            </a:fld>
+            <a:endParaRPr lang="en-US" dirty="0"/>
           </a:p>
         </p:txBody>
       </p:sp>
@@ -5232,16 +5361,33 @@
           <a:p>
             <a:r>
               <a:rPr lang="en-US" sz="3000" dirty="0" smtClean="0"/>
-              <a:t>Can be used but </a:t>
-            </a:r>
-            <a:r>
-              <a:rPr lang="en-US" sz="3000" dirty="0" smtClean="0"/>
-              <a:t>does </a:t>
-            </a:r>
-            <a:r>
-              <a:rPr lang="en-US" sz="3000" dirty="0" smtClean="0"/>
-              <a:t>not have type safety checks</a:t>
-            </a:r>
+              <a:t>Can be used but does not have type safety checks</a:t>
+            </a:r>
+          </a:p>
+        </p:txBody>
+      </p:sp>
+      <p:sp>
+        <p:nvSpPr>
+          <p:cNvPr id="4" name="Slide Number Placeholder 3"/>
+          <p:cNvSpPr>
+            <a:spLocks noGrp="1"/>
+          </p:cNvSpPr>
+          <p:nvPr>
+            <p:ph type="sldNum" sz="quarter" idx="12"/>
+          </p:nvPr>
+        </p:nvSpPr>
+        <p:spPr/>
+        <p:txBody>
+          <a:bodyPr>
+            <a:normAutofit lnSpcReduction="10000"/>
+          </a:bodyPr>
+          <a:lstStyle/>
+          <a:p>
+            <a:fld id="{4FAB73BC-B049-4115-A692-8D63A059BFB8}" type="slidenum">
+              <a:rPr lang="en-US" smtClean="0"/>
+              <a:t>11</a:t>
+            </a:fld>
+            <a:endParaRPr lang="en-US" dirty="0"/>
           </a:p>
         </p:txBody>
       </p:sp>
@@ -5322,6 +5468,31 @@
           </a:p>
         </p:txBody>
       </p:sp>
+      <p:sp>
+        <p:nvSpPr>
+          <p:cNvPr id="4" name="Slide Number Placeholder 3"/>
+          <p:cNvSpPr>
+            <a:spLocks noGrp="1"/>
+          </p:cNvSpPr>
+          <p:nvPr>
+            <p:ph type="sldNum" sz="quarter" idx="12"/>
+          </p:nvPr>
+        </p:nvSpPr>
+        <p:spPr/>
+        <p:txBody>
+          <a:bodyPr>
+            <a:normAutofit lnSpcReduction="10000"/>
+          </a:bodyPr>
+          <a:lstStyle/>
+          <a:p>
+            <a:fld id="{4FAB73BC-B049-4115-A692-8D63A059BFB8}" type="slidenum">
+              <a:rPr lang="en-US" smtClean="0"/>
+              <a:t>12</a:t>
+            </a:fld>
+            <a:endParaRPr lang="en-US" dirty="0"/>
+          </a:p>
+        </p:txBody>
+      </p:sp>
     </p:spTree>
     <p:extLst>
       <p:ext uri="{BB962C8B-B14F-4D97-AF65-F5344CB8AC3E}">
@@ -5433,6 +5604,31 @@
           </a:p>
         </p:txBody>
       </p:sp>
+      <p:sp>
+        <p:nvSpPr>
+          <p:cNvPr id="4" name="Slide Number Placeholder 3"/>
+          <p:cNvSpPr>
+            <a:spLocks noGrp="1"/>
+          </p:cNvSpPr>
+          <p:nvPr>
+            <p:ph type="sldNum" sz="quarter" idx="12"/>
+          </p:nvPr>
+        </p:nvSpPr>
+        <p:spPr/>
+        <p:txBody>
+          <a:bodyPr>
+            <a:normAutofit lnSpcReduction="10000"/>
+          </a:bodyPr>
+          <a:lstStyle/>
+          <a:p>
+            <a:fld id="{4FAB73BC-B049-4115-A692-8D63A059BFB8}" type="slidenum">
+              <a:rPr lang="en-US" smtClean="0"/>
+              <a:t>13</a:t>
+            </a:fld>
+            <a:endParaRPr lang="en-US" dirty="0"/>
+          </a:p>
+        </p:txBody>
+      </p:sp>
     </p:spTree>
     <p:extLst>
       <p:ext uri="{BB962C8B-B14F-4D97-AF65-F5344CB8AC3E}">
@@ -5507,6 +5703,31 @@
               <a:rPr lang="en-US" sz="3000" dirty="0" smtClean="0"/>
               <a:t>Type parameter’s scope is the entire corresponding class unless the type parameter is masked. </a:t>
             </a:r>
+          </a:p>
+        </p:txBody>
+      </p:sp>
+      <p:sp>
+        <p:nvSpPr>
+          <p:cNvPr id="4" name="Slide Number Placeholder 3"/>
+          <p:cNvSpPr>
+            <a:spLocks noGrp="1"/>
+          </p:cNvSpPr>
+          <p:nvPr>
+            <p:ph type="sldNum" sz="quarter" idx="12"/>
+          </p:nvPr>
+        </p:nvSpPr>
+        <p:spPr/>
+        <p:txBody>
+          <a:bodyPr>
+            <a:normAutofit lnSpcReduction="10000"/>
+          </a:bodyPr>
+          <a:lstStyle/>
+          <a:p>
+            <a:fld id="{4FAB73BC-B049-4115-A692-8D63A059BFB8}" type="slidenum">
+              <a:rPr lang="en-US" smtClean="0"/>
+              <a:t>14</a:t>
+            </a:fld>
+            <a:endParaRPr lang="en-US" dirty="0"/>
           </a:p>
         </p:txBody>
       </p:sp>
@@ -6122,6 +6343,31 @@
           </a:fontRef>
         </p:style>
       </p:cxnSp>
+      <p:sp>
+        <p:nvSpPr>
+          <p:cNvPr id="5" name="Slide Number Placeholder 4"/>
+          <p:cNvSpPr>
+            <a:spLocks noGrp="1"/>
+          </p:cNvSpPr>
+          <p:nvPr>
+            <p:ph type="sldNum" sz="quarter" idx="12"/>
+          </p:nvPr>
+        </p:nvSpPr>
+        <p:spPr/>
+        <p:txBody>
+          <a:bodyPr>
+            <a:normAutofit lnSpcReduction="10000"/>
+          </a:bodyPr>
+          <a:lstStyle/>
+          <a:p>
+            <a:fld id="{4FAB73BC-B049-4115-A692-8D63A059BFB8}" type="slidenum">
+              <a:rPr lang="en-US" smtClean="0"/>
+              <a:t>15</a:t>
+            </a:fld>
+            <a:endParaRPr lang="en-US" dirty="0"/>
+          </a:p>
+        </p:txBody>
+      </p:sp>
     </p:spTree>
     <p:extLst>
       <p:ext uri="{BB962C8B-B14F-4D97-AF65-F5344CB8AC3E}">
@@ -6239,6 +6485,31 @@
           </a:p>
         </p:txBody>
       </p:sp>
+      <p:sp>
+        <p:nvSpPr>
+          <p:cNvPr id="4" name="Slide Number Placeholder 3"/>
+          <p:cNvSpPr>
+            <a:spLocks noGrp="1"/>
+          </p:cNvSpPr>
+          <p:nvPr>
+            <p:ph type="sldNum" sz="quarter" idx="12"/>
+          </p:nvPr>
+        </p:nvSpPr>
+        <p:spPr/>
+        <p:txBody>
+          <a:bodyPr>
+            <a:normAutofit lnSpcReduction="10000"/>
+          </a:bodyPr>
+          <a:lstStyle/>
+          <a:p>
+            <a:fld id="{4FAB73BC-B049-4115-A692-8D63A059BFB8}" type="slidenum">
+              <a:rPr lang="en-US" smtClean="0"/>
+              <a:t>16</a:t>
+            </a:fld>
+            <a:endParaRPr lang="en-US" dirty="0"/>
+          </a:p>
+        </p:txBody>
+      </p:sp>
     </p:spTree>
     <p:extLst>
       <p:ext uri="{BB962C8B-B14F-4D97-AF65-F5344CB8AC3E}">
@@ -6458,6 +6729,31 @@
           </a:p>
         </p:txBody>
       </p:sp>
+      <p:sp>
+        <p:nvSpPr>
+          <p:cNvPr id="5" name="Slide Number Placeholder 4"/>
+          <p:cNvSpPr>
+            <a:spLocks noGrp="1"/>
+          </p:cNvSpPr>
+          <p:nvPr>
+            <p:ph type="sldNum" sz="quarter" idx="12"/>
+          </p:nvPr>
+        </p:nvSpPr>
+        <p:spPr/>
+        <p:txBody>
+          <a:bodyPr>
+            <a:normAutofit lnSpcReduction="10000"/>
+          </a:bodyPr>
+          <a:lstStyle/>
+          <a:p>
+            <a:fld id="{4FAB73BC-B049-4115-A692-8D63A059BFB8}" type="slidenum">
+              <a:rPr lang="en-US" smtClean="0"/>
+              <a:t>17</a:t>
+            </a:fld>
+            <a:endParaRPr lang="en-US" dirty="0"/>
+          </a:p>
+        </p:txBody>
+      </p:sp>
     </p:spTree>
     <p:extLst>
       <p:ext uri="{BB962C8B-B14F-4D97-AF65-F5344CB8AC3E}">
@@ -6597,13 +6893,33 @@
             </a:r>
             <a:r>
               <a:rPr lang="en-US" sz="3200" dirty="0"/>
-              <a:t> method removes the first/oldest element from the queue. </a:t>
-            </a:r>
-            <a:r>
-              <a:rPr lang="en-US" sz="3200"/>
-              <a:t>Stacks are often described as being "last-in, first-out" whereas queues represent a "first-in, first-out" behavior.</a:t>
-            </a:r>
-            <a:endParaRPr lang="en-US" sz="3200" dirty="0"/>
+              <a:t> method removes the first/oldest element from the queue. Stacks are often described as being "last-in, first-out" whereas queues represent a "first-in, first-out" behavior.</a:t>
+            </a:r>
+          </a:p>
+        </p:txBody>
+      </p:sp>
+      <p:sp>
+        <p:nvSpPr>
+          <p:cNvPr id="4" name="Slide Number Placeholder 3"/>
+          <p:cNvSpPr>
+            <a:spLocks noGrp="1"/>
+          </p:cNvSpPr>
+          <p:nvPr>
+            <p:ph type="sldNum" sz="quarter" idx="12"/>
+          </p:nvPr>
+        </p:nvSpPr>
+        <p:spPr/>
+        <p:txBody>
+          <a:bodyPr>
+            <a:normAutofit lnSpcReduction="10000"/>
+          </a:bodyPr>
+          <a:lstStyle/>
+          <a:p>
+            <a:fld id="{4FAB73BC-B049-4115-A692-8D63A059BFB8}" type="slidenum">
+              <a:rPr lang="en-US" smtClean="0"/>
+              <a:t>18</a:t>
+            </a:fld>
+            <a:endParaRPr lang="en-US" dirty="0"/>
           </a:p>
         </p:txBody>
       </p:sp>
@@ -6689,6 +7005,31 @@
           </a:p>
         </p:txBody>
       </p:sp>
+      <p:sp>
+        <p:nvSpPr>
+          <p:cNvPr id="4" name="Slide Number Placeholder 3"/>
+          <p:cNvSpPr>
+            <a:spLocks noGrp="1"/>
+          </p:cNvSpPr>
+          <p:nvPr>
+            <p:ph type="sldNum" sz="quarter" idx="12"/>
+          </p:nvPr>
+        </p:nvSpPr>
+        <p:spPr/>
+        <p:txBody>
+          <a:bodyPr>
+            <a:normAutofit lnSpcReduction="10000"/>
+          </a:bodyPr>
+          <a:lstStyle/>
+          <a:p>
+            <a:fld id="{4FAB73BC-B049-4115-A692-8D63A059BFB8}" type="slidenum">
+              <a:rPr lang="en-US" smtClean="0"/>
+              <a:t>2</a:t>
+            </a:fld>
+            <a:endParaRPr lang="en-US" dirty="0"/>
+          </a:p>
+        </p:txBody>
+      </p:sp>
     </p:spTree>
     <p:extLst>
       <p:ext uri="{BB962C8B-B14F-4D97-AF65-F5344CB8AC3E}">
@@ -6775,6 +7116,31 @@
           </a:p>
         </p:txBody>
       </p:sp>
+      <p:sp>
+        <p:nvSpPr>
+          <p:cNvPr id="4" name="Slide Number Placeholder 3"/>
+          <p:cNvSpPr>
+            <a:spLocks noGrp="1"/>
+          </p:cNvSpPr>
+          <p:nvPr>
+            <p:ph type="sldNum" sz="quarter" idx="12"/>
+          </p:nvPr>
+        </p:nvSpPr>
+        <p:spPr/>
+        <p:txBody>
+          <a:bodyPr>
+            <a:normAutofit lnSpcReduction="10000"/>
+          </a:bodyPr>
+          <a:lstStyle/>
+          <a:p>
+            <a:fld id="{4FAB73BC-B049-4115-A692-8D63A059BFB8}" type="slidenum">
+              <a:rPr lang="en-US" smtClean="0"/>
+              <a:t>3</a:t>
+            </a:fld>
+            <a:endParaRPr lang="en-US" dirty="0"/>
+          </a:p>
+        </p:txBody>
+      </p:sp>
     </p:spTree>
     <p:extLst>
       <p:ext uri="{BB962C8B-B14F-4D97-AF65-F5344CB8AC3E}">
@@ -6847,6 +7213,31 @@
           </a:p>
         </p:txBody>
       </p:sp>
+      <p:sp>
+        <p:nvSpPr>
+          <p:cNvPr id="2" name="Slide Number Placeholder 1"/>
+          <p:cNvSpPr>
+            <a:spLocks noGrp="1"/>
+          </p:cNvSpPr>
+          <p:nvPr>
+            <p:ph type="sldNum" sz="quarter" idx="12"/>
+          </p:nvPr>
+        </p:nvSpPr>
+        <p:spPr/>
+        <p:txBody>
+          <a:bodyPr>
+            <a:normAutofit lnSpcReduction="10000"/>
+          </a:bodyPr>
+          <a:lstStyle/>
+          <a:p>
+            <a:fld id="{4FAB73BC-B049-4115-A692-8D63A059BFB8}" type="slidenum">
+              <a:rPr lang="en-US" smtClean="0"/>
+              <a:t>4</a:t>
+            </a:fld>
+            <a:endParaRPr lang="en-US" dirty="0"/>
+          </a:p>
+        </p:txBody>
+      </p:sp>
     </p:spTree>
     <p:extLst>
       <p:ext uri="{BB962C8B-B14F-4D97-AF65-F5344CB8AC3E}">
@@ -6978,6 +7369,31 @@
           </a:p>
         </p:txBody>
       </p:sp>
+      <p:sp>
+        <p:nvSpPr>
+          <p:cNvPr id="4" name="Slide Number Placeholder 3"/>
+          <p:cNvSpPr>
+            <a:spLocks noGrp="1"/>
+          </p:cNvSpPr>
+          <p:nvPr>
+            <p:ph type="sldNum" sz="quarter" idx="12"/>
+          </p:nvPr>
+        </p:nvSpPr>
+        <p:spPr/>
+        <p:txBody>
+          <a:bodyPr>
+            <a:normAutofit lnSpcReduction="10000"/>
+          </a:bodyPr>
+          <a:lstStyle/>
+          <a:p>
+            <a:fld id="{4FAB73BC-B049-4115-A692-8D63A059BFB8}" type="slidenum">
+              <a:rPr lang="en-US" smtClean="0"/>
+              <a:t>5</a:t>
+            </a:fld>
+            <a:endParaRPr lang="en-US" dirty="0"/>
+          </a:p>
+        </p:txBody>
+      </p:sp>
     </p:spTree>
     <p:extLst>
       <p:ext uri="{BB962C8B-B14F-4D97-AF65-F5344CB8AC3E}">
@@ -7083,6 +7499,31 @@
           </a:p>
         </p:txBody>
       </p:sp>
+      <p:sp>
+        <p:nvSpPr>
+          <p:cNvPr id="4" name="Slide Number Placeholder 3"/>
+          <p:cNvSpPr>
+            <a:spLocks noGrp="1"/>
+          </p:cNvSpPr>
+          <p:nvPr>
+            <p:ph type="sldNum" sz="quarter" idx="12"/>
+          </p:nvPr>
+        </p:nvSpPr>
+        <p:spPr/>
+        <p:txBody>
+          <a:bodyPr>
+            <a:normAutofit lnSpcReduction="10000"/>
+          </a:bodyPr>
+          <a:lstStyle/>
+          <a:p>
+            <a:fld id="{4FAB73BC-B049-4115-A692-8D63A059BFB8}" type="slidenum">
+              <a:rPr lang="en-US" smtClean="0"/>
+              <a:t>6</a:t>
+            </a:fld>
+            <a:endParaRPr lang="en-US" dirty="0"/>
+          </a:p>
+        </p:txBody>
+      </p:sp>
     </p:spTree>
     <p:extLst>
       <p:ext uri="{BB962C8B-B14F-4D97-AF65-F5344CB8AC3E}">
@@ -7221,18 +7662,7 @@
                 <a:ea typeface="Consolas" charset="0"/>
                 <a:cs typeface="Consolas" charset="0"/>
               </a:rPr>
-              <a:t>interface </a:t>
-            </a:r>
-            <a:r>
-              <a:rPr lang="en-US" sz="2800" dirty="0" smtClean="0">
-                <a:solidFill>
-                  <a:srgbClr val="FF0000"/>
-                </a:solidFill>
-                <a:latin typeface="Consolas" charset="0"/>
-                <a:ea typeface="Consolas" charset="0"/>
-                <a:cs typeface="Consolas" charset="0"/>
-              </a:rPr>
-              <a:t>identifier&lt;</a:t>
+              <a:t>interface identifier&lt;</a:t>
             </a:r>
             <a:r>
               <a:rPr lang="en-US" sz="2800" dirty="0" err="1" smtClean="0">
@@ -7256,6 +7686,31 @@
               </a:rPr>
               <a:t>&gt; {}</a:t>
             </a:r>
+          </a:p>
+        </p:txBody>
+      </p:sp>
+      <p:sp>
+        <p:nvSpPr>
+          <p:cNvPr id="4" name="Slide Number Placeholder 3"/>
+          <p:cNvSpPr>
+            <a:spLocks noGrp="1"/>
+          </p:cNvSpPr>
+          <p:nvPr>
+            <p:ph type="sldNum" sz="quarter" idx="12"/>
+          </p:nvPr>
+        </p:nvSpPr>
+        <p:spPr/>
+        <p:txBody>
+          <a:bodyPr>
+            <a:normAutofit lnSpcReduction="10000"/>
+          </a:bodyPr>
+          <a:lstStyle/>
+          <a:p>
+            <a:fld id="{4FAB73BC-B049-4115-A692-8D63A059BFB8}" type="slidenum">
+              <a:rPr lang="en-US" smtClean="0"/>
+              <a:t>7</a:t>
+            </a:fld>
+            <a:endParaRPr lang="en-US" dirty="0"/>
           </a:p>
         </p:txBody>
       </p:sp>
@@ -7392,6 +7847,31 @@
           </a:p>
         </p:txBody>
       </p:sp>
+      <p:sp>
+        <p:nvSpPr>
+          <p:cNvPr id="4" name="Slide Number Placeholder 3"/>
+          <p:cNvSpPr>
+            <a:spLocks noGrp="1"/>
+          </p:cNvSpPr>
+          <p:nvPr>
+            <p:ph type="sldNum" sz="quarter" idx="12"/>
+          </p:nvPr>
+        </p:nvSpPr>
+        <p:spPr/>
+        <p:txBody>
+          <a:bodyPr>
+            <a:normAutofit lnSpcReduction="10000"/>
+          </a:bodyPr>
+          <a:lstStyle/>
+          <a:p>
+            <a:fld id="{4FAB73BC-B049-4115-A692-8D63A059BFB8}" type="slidenum">
+              <a:rPr lang="en-US" smtClean="0"/>
+              <a:t>8</a:t>
+            </a:fld>
+            <a:endParaRPr lang="en-US" dirty="0"/>
+          </a:p>
+        </p:txBody>
+      </p:sp>
     </p:spTree>
     <p:extLst>
       <p:ext uri="{BB962C8B-B14F-4D97-AF65-F5344CB8AC3E}">
@@ -7495,6 +7975,31 @@
               <a:t>as the actual type argument</a:t>
             </a:r>
             <a:endParaRPr lang="en-US" sz="3000" i="1" dirty="0" smtClean="0"/>
+          </a:p>
+        </p:txBody>
+      </p:sp>
+      <p:sp>
+        <p:nvSpPr>
+          <p:cNvPr id="4" name="Slide Number Placeholder 3"/>
+          <p:cNvSpPr>
+            <a:spLocks noGrp="1"/>
+          </p:cNvSpPr>
+          <p:nvPr>
+            <p:ph type="sldNum" sz="quarter" idx="12"/>
+          </p:nvPr>
+        </p:nvSpPr>
+        <p:spPr/>
+        <p:txBody>
+          <a:bodyPr>
+            <a:normAutofit lnSpcReduction="10000"/>
+          </a:bodyPr>
+          <a:lstStyle/>
+          <a:p>
+            <a:fld id="{4FAB73BC-B049-4115-A692-8D63A059BFB8}" type="slidenum">
+              <a:rPr lang="en-US" smtClean="0"/>
+              <a:t>9</a:t>
+            </a:fld>
+            <a:endParaRPr lang="en-US" dirty="0"/>
           </a:p>
         </p:txBody>
       </p:sp>

</xml_diff>